<commit_message>
powerpoint versione 2 con aggiunta offerte
</commit_message>
<xml_diff>
--- a/casi_duso_ppt_versione2.pptx
+++ b/casi_duso_ppt_versione2.pptx
@@ -6094,6 +6094,134 @@
           </p:style>
         </p:cxnSp>
       </p:grpSp>
+      <p:sp>
+        <p:nvSpPr>
+          <p:cNvPr id="38" name="Ovale 37">
+            <a:extLst>
+              <a:ext uri="{FF2B5EF4-FFF2-40B4-BE49-F238E27FC236}">
+                <a16:creationId xmlns:a16="http://schemas.microsoft.com/office/drawing/2014/main" id="{BED79F35-7643-C522-F3FB-5E5EBF3BC659}"/>
+              </a:ext>
+            </a:extLst>
+          </p:cNvPr>
+          <p:cNvSpPr/>
+          <p:nvPr/>
+        </p:nvSpPr>
+        <p:spPr>
+          <a:xfrm>
+            <a:off x="5165698" y="5143546"/>
+            <a:ext cx="1245530" cy="438166"/>
+          </a:xfrm>
+          <a:prstGeom prst="ellipse">
+            <a:avLst/>
+          </a:prstGeom>
+          <a:solidFill>
+            <a:schemeClr val="bg1"/>
+          </a:solidFill>
+        </p:spPr>
+        <p:style>
+          <a:lnRef idx="2">
+            <a:schemeClr val="accent1">
+              <a:shade val="15000"/>
+            </a:schemeClr>
+          </a:lnRef>
+          <a:fillRef idx="1">
+            <a:schemeClr val="accent1"/>
+          </a:fillRef>
+          <a:effectRef idx="0">
+            <a:schemeClr val="accent1"/>
+          </a:effectRef>
+          <a:fontRef idx="minor">
+            <a:schemeClr val="lt1"/>
+          </a:fontRef>
+        </p:style>
+        <p:txBody>
+          <a:bodyPr rtlCol="0" anchor="ctr"/>
+          <a:lstStyle/>
+          <a:p>
+            <a:pPr algn="ctr"/>
+            <a:endParaRPr lang="it-IT"/>
+          </a:p>
+        </p:txBody>
+      </p:sp>
+      <p:sp>
+        <p:nvSpPr>
+          <p:cNvPr id="40" name="CasellaDiTesto 39">
+            <a:extLst>
+              <a:ext uri="{FF2B5EF4-FFF2-40B4-BE49-F238E27FC236}">
+                <a16:creationId xmlns:a16="http://schemas.microsoft.com/office/drawing/2014/main" id="{F58B442C-2B3A-E527-7002-23CD53F77255}"/>
+              </a:ext>
+            </a:extLst>
+          </p:cNvPr>
+          <p:cNvSpPr txBox="1"/>
+          <p:nvPr/>
+        </p:nvSpPr>
+        <p:spPr>
+          <a:xfrm>
+            <a:off x="5327262" y="5190021"/>
+            <a:ext cx="1760998" cy="523220"/>
+          </a:xfrm>
+          <a:prstGeom prst="rect">
+            <a:avLst/>
+          </a:prstGeom>
+          <a:noFill/>
+        </p:spPr>
+        <p:txBody>
+          <a:bodyPr wrap="square" rtlCol="0">
+            <a:spAutoFit/>
+          </a:bodyPr>
+          <a:lstStyle/>
+          <a:p>
+            <a:r>
+              <a:rPr lang="it-IT" sz="1400" dirty="0"/>
+              <a:t>Offerte</a:t>
+            </a:r>
+          </a:p>
+          <a:p>
+            <a:endParaRPr lang="it-IT" sz="1400" dirty="0"/>
+          </a:p>
+        </p:txBody>
+      </p:sp>
+      <p:cxnSp>
+        <p:nvCxnSpPr>
+          <p:cNvPr id="44" name="Connettore diritto 43">
+            <a:extLst>
+              <a:ext uri="{FF2B5EF4-FFF2-40B4-BE49-F238E27FC236}">
+                <a16:creationId xmlns:a16="http://schemas.microsoft.com/office/drawing/2014/main" id="{CEF8DE24-2D0F-D8FB-0131-2622B917022A}"/>
+              </a:ext>
+            </a:extLst>
+          </p:cNvPr>
+          <p:cNvCxnSpPr/>
+          <p:nvPr/>
+        </p:nvCxnSpPr>
+        <p:spPr>
+          <a:xfrm>
+            <a:off x="2149095" y="4047893"/>
+            <a:ext cx="3075010" cy="1173433"/>
+          </a:xfrm>
+          <a:prstGeom prst="line">
+            <a:avLst/>
+          </a:prstGeom>
+          <a:ln>
+            <a:solidFill>
+              <a:schemeClr val="tx1"/>
+            </a:solidFill>
+          </a:ln>
+        </p:spPr>
+        <p:style>
+          <a:lnRef idx="2">
+            <a:schemeClr val="accent1"/>
+          </a:lnRef>
+          <a:fillRef idx="0">
+            <a:schemeClr val="accent1"/>
+          </a:fillRef>
+          <a:effectRef idx="1">
+            <a:schemeClr val="accent1"/>
+          </a:effectRef>
+          <a:fontRef idx="minor">
+            <a:schemeClr val="tx1"/>
+          </a:fontRef>
+        </p:style>
+      </p:cxnSp>
     </p:spTree>
     <p:extLst>
       <p:ext uri="{BB962C8B-B14F-4D97-AF65-F5344CB8AC3E}">

</xml_diff>